<commit_message>
added CPU and GPU full run time results
</commit_message>
<xml_diff>
--- a/FinalProject/ProjectPresentation.pptx
+++ b/FinalProject/ProjectPresentation.pptx
@@ -8282,10 +8282,10 @@
       </p:sp>
       <p:pic>
         <p:nvPicPr>
-          <p:cNvPr id="6" name="Picture 5">
-            <a:extLst>
-              <a:ext uri="{FF2B5EF4-FFF2-40B4-BE49-F238E27FC236}">
-                <a16:creationId xmlns:a16="http://schemas.microsoft.com/office/drawing/2014/main" id="{5371D13B-476F-4FD6-ACF6-EEFA6CCFCB78}"/>
+          <p:cNvPr id="3" name="Picture 2">
+            <a:extLst>
+              <a:ext uri="{FF2B5EF4-FFF2-40B4-BE49-F238E27FC236}">
+                <a16:creationId xmlns:a16="http://schemas.microsoft.com/office/drawing/2014/main" id="{53925057-1977-426F-AD88-B7BFF9AEC90E}"/>
               </a:ext>
             </a:extLst>
           </p:cNvPr>
@@ -8302,8 +8302,8 @@
         </p:blipFill>
         <p:spPr>
           <a:xfrm>
-            <a:off x="838200" y="2178305"/>
-            <a:ext cx="4049486" cy="1828800"/>
+            <a:off x="1400771" y="1424136"/>
+            <a:ext cx="4206240" cy="4790445"/>
           </a:xfrm>
           <a:prstGeom prst="rect">
             <a:avLst/>
@@ -8312,10 +8312,10 @@
       </p:pic>
       <p:pic>
         <p:nvPicPr>
-          <p:cNvPr id="7" name="Picture 6">
-            <a:extLst>
-              <a:ext uri="{FF2B5EF4-FFF2-40B4-BE49-F238E27FC236}">
-                <a16:creationId xmlns:a16="http://schemas.microsoft.com/office/drawing/2014/main" id="{E39660A0-F7D4-4AF5-8342-D6535F07CA07}"/>
+          <p:cNvPr id="4" name="Picture 3">
+            <a:extLst>
+              <a:ext uri="{FF2B5EF4-FFF2-40B4-BE49-F238E27FC236}">
+                <a16:creationId xmlns:a16="http://schemas.microsoft.com/office/drawing/2014/main" id="{AD66083C-B5E4-497B-8FAE-61AA0C9165AF}"/>
               </a:ext>
             </a:extLst>
           </p:cNvPr>
@@ -8332,14 +8332,72 @@
         </p:blipFill>
         <p:spPr>
           <a:xfrm>
-            <a:off x="6582092" y="2178305"/>
-            <a:ext cx="3986981" cy="1828800"/>
+            <a:off x="6396085" y="1424136"/>
+            <a:ext cx="4117182" cy="4791456"/>
           </a:xfrm>
           <a:prstGeom prst="rect">
             <a:avLst/>
           </a:prstGeom>
         </p:spPr>
       </p:pic>
+      <p:sp>
+        <p:nvSpPr>
+          <p:cNvPr id="5" name="TextBox 4">
+            <a:extLst>
+              <a:ext uri="{FF2B5EF4-FFF2-40B4-BE49-F238E27FC236}">
+                <a16:creationId xmlns:a16="http://schemas.microsoft.com/office/drawing/2014/main" id="{367DD1EE-DA11-4B40-985E-6597A9594394}"/>
+              </a:ext>
+            </a:extLst>
+          </p:cNvPr>
+          <p:cNvSpPr txBox="1"/>
+          <p:nvPr/>
+        </p:nvSpPr>
+        <p:spPr>
+          <a:xfrm>
+            <a:off x="1612978" y="6262773"/>
+            <a:ext cx="8752204" cy="369332"/>
+          </a:xfrm>
+          <a:prstGeom prst="rect">
+            <a:avLst/>
+          </a:prstGeom>
+          <a:noFill/>
+        </p:spPr>
+        <p:txBody>
+          <a:bodyPr wrap="none" rtlCol="0">
+            <a:spAutoFit/>
+          </a:bodyPr>
+          <a:lstStyle/>
+          <a:p>
+            <a:r>
+              <a:rPr lang="en-US" b="1" dirty="0">
+                <a:solidFill>
+                  <a:schemeClr val="accent1">
+                    <a:lumMod val="50000"/>
+                  </a:schemeClr>
+                </a:solidFill>
+              </a:rPr>
+              <a:t>Total CPU Training Time 45.82 minutes, Total GPU Training Time 6.23 minutes. </a:t>
+            </a:r>
+            <a:r>
+              <a:rPr lang="en-US" b="1">
+                <a:solidFill>
+                  <a:schemeClr val="accent1">
+                    <a:lumMod val="50000"/>
+                  </a:schemeClr>
+                </a:solidFill>
+              </a:rPr>
+              <a:t>Gain 7.36X!</a:t>
+            </a:r>
+            <a:endParaRPr lang="en-US" b="1" dirty="0">
+              <a:solidFill>
+                <a:schemeClr val="accent1">
+                  <a:lumMod val="50000"/>
+                </a:schemeClr>
+              </a:solidFill>
+            </a:endParaRPr>
+          </a:p>
+        </p:txBody>
+      </p:sp>
     </p:spTree>
     <p:extLst>
       <p:ext uri="{BB962C8B-B14F-4D97-AF65-F5344CB8AC3E}">

</xml_diff>

<commit_message>
added useful links slide
</commit_message>
<xml_diff>
--- a/FinalProject/ProjectPresentation.pptx
+++ b/FinalProject/ProjectPresentation.pptx
@@ -14,7 +14,8 @@
     <p:sldId id="257" r:id="rId8"/>
     <p:sldId id="258" r:id="rId9"/>
     <p:sldId id="263" r:id="rId10"/>
-    <p:sldId id="265" r:id="rId11"/>
+    <p:sldId id="266" r:id="rId11"/>
+    <p:sldId id="265" r:id="rId12"/>
   </p:sldIdLst>
   <p:sldSz cx="12192000" cy="6858000"/>
   <p:notesSz cx="6858000" cy="9144000"/>
@@ -127,6 +128,7 @@
             <p14:sldId id="257"/>
             <p14:sldId id="258"/>
             <p14:sldId id="263"/>
+            <p14:sldId id="266"/>
             <p14:sldId id="265"/>
           </p14:sldIdLst>
         </p14:section>
@@ -4464,6 +4466,173 @@
       </p:grpSpPr>
       <p:sp>
         <p:nvSpPr>
+          <p:cNvPr id="2" name="Title 1">
+            <a:extLst>
+              <a:ext uri="{FF2B5EF4-FFF2-40B4-BE49-F238E27FC236}">
+                <a16:creationId xmlns:a16="http://schemas.microsoft.com/office/drawing/2014/main" id="{6D28635B-03F8-4100-B0CD-37CBD875CC13}"/>
+              </a:ext>
+            </a:extLst>
+          </p:cNvPr>
+          <p:cNvSpPr>
+            <a:spLocks noGrp="1"/>
+          </p:cNvSpPr>
+          <p:nvPr>
+            <p:ph type="title"/>
+          </p:nvPr>
+        </p:nvSpPr>
+        <p:spPr/>
+        <p:txBody>
+          <a:bodyPr/>
+          <a:lstStyle/>
+          <a:p>
+            <a:r>
+              <a:rPr lang="en-US" dirty="0"/>
+              <a:t>Useful Links</a:t>
+            </a:r>
+          </a:p>
+        </p:txBody>
+      </p:sp>
+      <p:sp>
+        <p:nvSpPr>
+          <p:cNvPr id="3" name="Content Placeholder 2">
+            <a:extLst>
+              <a:ext uri="{FF2B5EF4-FFF2-40B4-BE49-F238E27FC236}">
+                <a16:creationId xmlns:a16="http://schemas.microsoft.com/office/drawing/2014/main" id="{B99E0540-AC0A-424A-9E43-FD0ADFCAB1A4}"/>
+              </a:ext>
+            </a:extLst>
+          </p:cNvPr>
+          <p:cNvSpPr>
+            <a:spLocks noGrp="1"/>
+          </p:cNvSpPr>
+          <p:nvPr>
+            <p:ph sz="half" idx="1"/>
+          </p:nvPr>
+        </p:nvSpPr>
+        <p:spPr>
+          <a:xfrm>
+            <a:off x="838200" y="1825625"/>
+            <a:ext cx="10515600" cy="4351338"/>
+          </a:xfrm>
+        </p:spPr>
+        <p:txBody>
+          <a:bodyPr/>
+          <a:lstStyle/>
+          <a:p>
+            <a:r>
+              <a:rPr lang="fi-FI" dirty="0"/>
+              <a:t>tf.data (</a:t>
+            </a:r>
+            <a:r>
+              <a:rPr lang="fi-FI" dirty="0">
+                <a:hlinkClick r:id="rId2"/>
+              </a:rPr>
+              <a:t>https://youtu.be/uIcqeP7MFH0</a:t>
+            </a:r>
+            <a:r>
+              <a:rPr lang="fi-FI" dirty="0"/>
+              <a:t>)</a:t>
+            </a:r>
+          </a:p>
+          <a:p>
+            <a:r>
+              <a:rPr lang="en-US" dirty="0" err="1"/>
+              <a:t>Tensorflow</a:t>
+            </a:r>
+            <a:r>
+              <a:rPr lang="en-US" dirty="0"/>
+              <a:t> Embeddings (https://youtu.be/eBbEDRsCmv4?t=1081)</a:t>
+            </a:r>
+          </a:p>
+          <a:p>
+            <a:r>
+              <a:rPr lang="en-US" dirty="0"/>
+              <a:t>Batch Normalization (</a:t>
+            </a:r>
+            <a:r>
+              <a:rPr lang="en-US" dirty="0">
+                <a:hlinkClick r:id="rId3"/>
+              </a:rPr>
+              <a:t>https://towardsdatascience.com/batch-normalization-in-neural-networks-1ac91516821c</a:t>
+            </a:r>
+            <a:r>
+              <a:rPr lang="en-US" dirty="0"/>
+              <a:t>)</a:t>
+            </a:r>
+          </a:p>
+          <a:p>
+            <a:r>
+              <a:rPr lang="en-US" dirty="0"/>
+              <a:t>SGD, Momentum, </a:t>
+            </a:r>
+            <a:r>
+              <a:rPr lang="en-US" dirty="0" err="1"/>
+              <a:t>RMSPRop</a:t>
+            </a:r>
+            <a:r>
+              <a:rPr lang="en-US" dirty="0"/>
+              <a:t>, and </a:t>
+            </a:r>
+            <a:r>
+              <a:rPr lang="en-US"/>
+              <a:t>Adam Optimization (</a:t>
+            </a:r>
+            <a:r>
+              <a:rPr lang="en-US">
+                <a:hlinkClick r:id="rId4"/>
+              </a:rPr>
+              <a:t>https</a:t>
+            </a:r>
+            <a:r>
+              <a:rPr lang="en-US" dirty="0">
+                <a:hlinkClick r:id="rId4"/>
+              </a:rPr>
+              <a:t>://devblogs.nvidia.com/</a:t>
+            </a:r>
+            <a:r>
+              <a:rPr lang="en-US">
+                <a:hlinkClick r:id="rId4"/>
+              </a:rPr>
+              <a:t>deep-learning-nutshell-history-training/</a:t>
+            </a:r>
+            <a:r>
+              <a:rPr lang="en-US"/>
+              <a:t>)</a:t>
+            </a:r>
+          </a:p>
+        </p:txBody>
+      </p:sp>
+    </p:spTree>
+    <p:extLst>
+      <p:ext uri="{BB962C8B-B14F-4D97-AF65-F5344CB8AC3E}">
+        <p14:creationId xmlns:p14="http://schemas.microsoft.com/office/powerpoint/2010/main" val="950609925"/>
+      </p:ext>
+    </p:extLst>
+  </p:cSld>
+  <p:clrMapOvr>
+    <a:masterClrMapping/>
+  </p:clrMapOvr>
+</p:sld>
+</file>
+
+<file path=ppt/slides/slide11.xml><?xml version="1.0" encoding="utf-8"?>
+<p:sld xmlns:a="http://schemas.openxmlformats.org/drawingml/2006/main" xmlns:r="http://schemas.openxmlformats.org/officeDocument/2006/relationships" xmlns:p="http://schemas.openxmlformats.org/presentationml/2006/main">
+  <p:cSld>
+    <p:spTree>
+      <p:nvGrpSpPr>
+        <p:cNvPr id="1" name=""/>
+        <p:cNvGrpSpPr/>
+        <p:nvPr/>
+      </p:nvGrpSpPr>
+      <p:grpSpPr>
+        <a:xfrm>
+          <a:off x="0" y="0"/>
+          <a:ext cx="0" cy="0"/>
+          <a:chOff x="0" y="0"/>
+          <a:chExt cx="0" cy="0"/>
+        </a:xfrm>
+      </p:grpSpPr>
+      <p:sp>
+        <p:nvSpPr>
           <p:cNvPr id="5" name="Title 4">
             <a:extLst>
               <a:ext uri="{FF2B5EF4-FFF2-40B4-BE49-F238E27FC236}">

</xml_diff>